<commit_message>
Fixed documentation and presentation
</commit_message>
<xml_diff>
--- a/Dancing Stars.pptx
+++ b/Dancing Stars.pptx
@@ -110,6 +110,11 @@
       </a:defRPr>
     </a:lvl9pPr>
   </p:defaultTextStyle>
+  <p:extLst>
+    <p:ext uri="{EFAFB233-063F-42B5-8137-9DF3F51BA10A}">
+      <p15:sldGuideLst xmlns:p15="http://schemas.microsoft.com/office/powerpoint/2012/main"/>
+    </p:ext>
+  </p:extLst>
 </p:presentation>
 </file>
 
@@ -3845,6 +3850,36 @@
           </a:p>
         </p:txBody>
       </p:sp>
+      <p:pic>
+        <p:nvPicPr>
+          <p:cNvPr id="4" name="Picture 3">
+            <a:extLst>
+              <a:ext uri="{FF2B5EF4-FFF2-40B4-BE49-F238E27FC236}">
+                <a16:creationId xmlns:a16="http://schemas.microsoft.com/office/drawing/2014/main" id="{6DAC76BA-21F3-2B3A-310C-33D963BB5936}"/>
+              </a:ext>
+            </a:extLst>
+          </p:cNvPr>
+          <p:cNvPicPr>
+            <a:picLocks noChangeAspect="1"/>
+          </p:cNvPicPr>
+          <p:nvPr/>
+        </p:nvPicPr>
+        <p:blipFill>
+          <a:blip r:embed="rId2"/>
+          <a:stretch>
+            <a:fillRect/>
+          </a:stretch>
+        </p:blipFill>
+        <p:spPr>
+          <a:xfrm>
+            <a:off x="871105" y="1471199"/>
+            <a:ext cx="10449787" cy="4270971"/>
+          </a:xfrm>
+          <a:prstGeom prst="rect">
+            <a:avLst/>
+          </a:prstGeom>
+        </p:spPr>
+      </p:pic>
     </p:spTree>
     <p:extLst>
       <p:ext uri="{BB962C8B-B14F-4D97-AF65-F5344CB8AC3E}">
@@ -4043,6 +4078,35 @@
           </a:p>
         </p:txBody>
       </p:sp>
+      <p:pic>
+        <p:nvPicPr>
+          <p:cNvPr id="3" name="Picture 2">
+            <a:extLst>
+              <a:ext uri="{FF2B5EF4-FFF2-40B4-BE49-F238E27FC236}">
+                <a16:creationId xmlns:a16="http://schemas.microsoft.com/office/drawing/2014/main" id="{0EE91237-032F-4109-6F67-EB71D27AC174}"/>
+              </a:ext>
+            </a:extLst>
+          </p:cNvPr>
+          <p:cNvPicPr>
+            <a:picLocks noChangeAspect="1"/>
+          </p:cNvPicPr>
+          <p:nvPr/>
+        </p:nvPicPr>
+        <p:blipFill rotWithShape="1">
+          <a:blip r:embed="rId2"/>
+          <a:srcRect b="6732"/>
+          <a:stretch/>
+        </p:blipFill>
+        <p:spPr>
+          <a:xfrm>
+            <a:off x="1395595" y="1245283"/>
+            <a:ext cx="9901509" cy="4642169"/>
+          </a:xfrm>
+          <a:prstGeom prst="rect">
+            <a:avLst/>
+          </a:prstGeom>
+        </p:spPr>
+      </p:pic>
     </p:spTree>
     <p:extLst>
       <p:ext uri="{BB962C8B-B14F-4D97-AF65-F5344CB8AC3E}">
@@ -4127,6 +4191,36 @@
           </a:p>
         </p:txBody>
       </p:sp>
+      <p:pic>
+        <p:nvPicPr>
+          <p:cNvPr id="3" name="Picture 2">
+            <a:extLst>
+              <a:ext uri="{FF2B5EF4-FFF2-40B4-BE49-F238E27FC236}">
+                <a16:creationId xmlns:a16="http://schemas.microsoft.com/office/drawing/2014/main" id="{63437142-116A-7F5E-3078-6FCA00244BBA}"/>
+              </a:ext>
+            </a:extLst>
+          </p:cNvPr>
+          <p:cNvPicPr>
+            <a:picLocks noChangeAspect="1"/>
+          </p:cNvPicPr>
+          <p:nvPr/>
+        </p:nvPicPr>
+        <p:blipFill>
+          <a:blip r:embed="rId2"/>
+          <a:stretch>
+            <a:fillRect/>
+          </a:stretch>
+        </p:blipFill>
+        <p:spPr>
+          <a:xfrm>
+            <a:off x="1941915" y="1302921"/>
+            <a:ext cx="8308170" cy="4712868"/>
+          </a:xfrm>
+          <a:prstGeom prst="rect">
+            <a:avLst/>
+          </a:prstGeom>
+        </p:spPr>
+      </p:pic>
     </p:spTree>
     <p:extLst>
       <p:ext uri="{BB962C8B-B14F-4D97-AF65-F5344CB8AC3E}">

</xml_diff>